<commit_message>
Done with practical exercise 2
</commit_message>
<xml_diff>
--- a/slides/Practical Exercise 2 - construction and destruction techniques, operator overloading.pptx
+++ b/slides/Practical Exercise 2 - construction and destruction techniques, operator overloading.pptx
@@ -18,6 +18,9 @@
     <p:sldId id="266" r:id="rId12"/>
     <p:sldId id="267" r:id="rId13"/>
     <p:sldId id="268" r:id="rId14"/>
+    <p:sldId id="269" r:id="rId15"/>
+    <p:sldId id="270" r:id="rId16"/>
+    <p:sldId id="271" r:id="rId17"/>
   </p:sldIdLst>
   <p:sldSz cx="12192000" cy="6858000"/>
   <p:notesSz cx="6858000" cy="9144000"/>
@@ -145,9 +148,15 @@
             <p14:sldId id="266"/>
             <p14:sldId id="267"/>
             <p14:sldId id="268"/>
+            <p14:sldId id="269"/>
+            <p14:sldId id="270"/>
+            <p14:sldId id="271"/>
           </p14:sldIdLst>
         </p14:section>
       </p14:sectionLst>
+    </p:ext>
+    <p:ext uri="{EFAFB233-063F-42B5-8137-9DF3F51BA10A}">
+      <p15:sldGuideLst xmlns:p15="http://schemas.microsoft.com/office/powerpoint/2012/main"/>
     </p:ext>
   </p:extLst>
 </p:presentation>
@@ -3929,6 +3938,381 @@
 </p:sld>
 </file>
 
+<file path=ppt/slides/slide14.xml><?xml version="1.0" encoding="utf-8"?>
+<p:sld xmlns:a="http://schemas.openxmlformats.org/drawingml/2006/main" xmlns:r="http://schemas.openxmlformats.org/officeDocument/2006/relationships" xmlns:p="http://schemas.openxmlformats.org/presentationml/2006/main">
+  <p:cSld>
+    <p:spTree>
+      <p:nvGrpSpPr>
+        <p:cNvPr id="1" name=""/>
+        <p:cNvGrpSpPr/>
+        <p:nvPr/>
+      </p:nvGrpSpPr>
+      <p:grpSpPr>
+        <a:xfrm>
+          <a:off x="0" y="0"/>
+          <a:ext cx="0" cy="0"/>
+          <a:chOff x="0" y="0"/>
+          <a:chExt cx="0" cy="0"/>
+        </a:xfrm>
+      </p:grpSpPr>
+      <p:sp>
+        <p:nvSpPr>
+          <p:cNvPr id="4" name="Title 3">
+            <a:extLst>
+              <a:ext uri="{FF2B5EF4-FFF2-40B4-BE49-F238E27FC236}">
+                <a16:creationId xmlns:a16="http://schemas.microsoft.com/office/drawing/2014/main" id="{3E21AF7E-5C32-E9C4-29F9-E40E4FE99665}"/>
+              </a:ext>
+            </a:extLst>
+          </p:cNvPr>
+          <p:cNvSpPr>
+            <a:spLocks noGrp="1"/>
+          </p:cNvSpPr>
+          <p:nvPr>
+            <p:ph type="title"/>
+          </p:nvPr>
+        </p:nvSpPr>
+        <p:spPr/>
+        <p:txBody>
+          <a:bodyPr/>
+          <a:lstStyle/>
+          <a:p>
+            <a:r>
+              <a:rPr lang="en-US" dirty="0"/>
+              <a:t>Operator overloading</a:t>
+            </a:r>
+          </a:p>
+        </p:txBody>
+      </p:sp>
+      <p:sp>
+        <p:nvSpPr>
+          <p:cNvPr id="5" name="Content Placeholder 4">
+            <a:extLst>
+              <a:ext uri="{FF2B5EF4-FFF2-40B4-BE49-F238E27FC236}">
+                <a16:creationId xmlns:a16="http://schemas.microsoft.com/office/drawing/2014/main" id="{0D58291B-4341-E037-7D9E-A734FCE36710}"/>
+              </a:ext>
+            </a:extLst>
+          </p:cNvPr>
+          <p:cNvSpPr>
+            <a:spLocks noGrp="1"/>
+          </p:cNvSpPr>
+          <p:nvPr>
+            <p:ph idx="1"/>
+          </p:nvPr>
+        </p:nvSpPr>
+        <p:spPr/>
+        <p:txBody>
+          <a:bodyPr/>
+          <a:lstStyle/>
+          <a:p>
+            <a:r>
+              <a:rPr lang="en-US" dirty="0"/>
+              <a:t>We need a transaction class to keep track of the transactions made in a system.</a:t>
+            </a:r>
+          </a:p>
+          <a:p>
+            <a:endParaRPr lang="en-US" dirty="0"/>
+          </a:p>
+          <a:p>
+            <a:r>
+              <a:rPr lang="en-US" dirty="0"/>
+              <a:t>This class has the following attributes: amount (positive or negative) and date.</a:t>
+            </a:r>
+          </a:p>
+          <a:p>
+            <a:endParaRPr lang="en-US" dirty="0"/>
+          </a:p>
+          <a:p>
+            <a:r>
+              <a:rPr lang="en-US" dirty="0"/>
+              <a:t>We want to be able to add perform the following:</a:t>
+            </a:r>
+          </a:p>
+          <a:p>
+            <a:pPr lvl="1"/>
+            <a:r>
+              <a:rPr lang="en-US" dirty="0"/>
+              <a:t>Arithmetic operations on 2 transactions (+,-,*,/)</a:t>
+            </a:r>
+          </a:p>
+          <a:p>
+            <a:pPr lvl="1"/>
+            <a:r>
+              <a:rPr lang="en-US" dirty="0"/>
+              <a:t>Arithmetic operations on a transaction and a number</a:t>
+            </a:r>
+          </a:p>
+          <a:p>
+            <a:pPr lvl="1"/>
+            <a:endParaRPr lang="en-US" dirty="0"/>
+          </a:p>
+        </p:txBody>
+      </p:sp>
+    </p:spTree>
+    <p:extLst>
+      <p:ext uri="{BB962C8B-B14F-4D97-AF65-F5344CB8AC3E}">
+        <p14:creationId xmlns:p14="http://schemas.microsoft.com/office/powerpoint/2010/main" val="692789459"/>
+      </p:ext>
+    </p:extLst>
+  </p:cSld>
+  <p:clrMapOvr>
+    <a:masterClrMapping/>
+  </p:clrMapOvr>
+</p:sld>
+</file>
+
+<file path=ppt/slides/slide15.xml><?xml version="1.0" encoding="utf-8"?>
+<p:sld xmlns:a="http://schemas.openxmlformats.org/drawingml/2006/main" xmlns:r="http://schemas.openxmlformats.org/officeDocument/2006/relationships" xmlns:p="http://schemas.openxmlformats.org/presentationml/2006/main">
+  <p:cSld>
+    <p:spTree>
+      <p:nvGrpSpPr>
+        <p:cNvPr id="1" name=""/>
+        <p:cNvGrpSpPr/>
+        <p:nvPr/>
+      </p:nvGrpSpPr>
+      <p:grpSpPr>
+        <a:xfrm>
+          <a:off x="0" y="0"/>
+          <a:ext cx="0" cy="0"/>
+          <a:chOff x="0" y="0"/>
+          <a:chExt cx="0" cy="0"/>
+        </a:xfrm>
+      </p:grpSpPr>
+      <p:sp>
+        <p:nvSpPr>
+          <p:cNvPr id="4" name="Title 3">
+            <a:extLst>
+              <a:ext uri="{FF2B5EF4-FFF2-40B4-BE49-F238E27FC236}">
+                <a16:creationId xmlns:a16="http://schemas.microsoft.com/office/drawing/2014/main" id="{3E21AF7E-5C32-E9C4-29F9-E40E4FE99665}"/>
+              </a:ext>
+            </a:extLst>
+          </p:cNvPr>
+          <p:cNvSpPr>
+            <a:spLocks noGrp="1"/>
+          </p:cNvSpPr>
+          <p:nvPr>
+            <p:ph type="title"/>
+          </p:nvPr>
+        </p:nvSpPr>
+        <p:spPr/>
+        <p:txBody>
+          <a:bodyPr/>
+          <a:lstStyle/>
+          <a:p>
+            <a:r>
+              <a:rPr lang="en-US" dirty="0"/>
+              <a:t>Operator overloading – setup </a:t>
+            </a:r>
+          </a:p>
+        </p:txBody>
+      </p:sp>
+      <p:sp>
+        <p:nvSpPr>
+          <p:cNvPr id="5" name="Content Placeholder 4">
+            <a:extLst>
+              <a:ext uri="{FF2B5EF4-FFF2-40B4-BE49-F238E27FC236}">
+                <a16:creationId xmlns:a16="http://schemas.microsoft.com/office/drawing/2014/main" id="{0D58291B-4341-E037-7D9E-A734FCE36710}"/>
+              </a:ext>
+            </a:extLst>
+          </p:cNvPr>
+          <p:cNvSpPr>
+            <a:spLocks noGrp="1"/>
+          </p:cNvSpPr>
+          <p:nvPr>
+            <p:ph idx="1"/>
+          </p:nvPr>
+        </p:nvSpPr>
+        <p:spPr/>
+        <p:txBody>
+          <a:bodyPr>
+            <a:normAutofit lnSpcReduction="10000"/>
+          </a:bodyPr>
+          <a:lstStyle/>
+          <a:p>
+            <a:r>
+              <a:rPr lang="en-US" dirty="0"/>
+              <a:t>Create the transaction class with the specified attributes</a:t>
+            </a:r>
+          </a:p>
+          <a:p>
+            <a:endParaRPr lang="en-US" dirty="0"/>
+          </a:p>
+          <a:p>
+            <a:r>
+              <a:rPr lang="en-US" dirty="0"/>
+              <a:t>Write custom dunder methods for the required operations (+,-,/,*)</a:t>
+            </a:r>
+          </a:p>
+          <a:p>
+            <a:endParaRPr lang="en-US" dirty="0"/>
+          </a:p>
+          <a:p>
+            <a:r>
+              <a:rPr lang="en-US" dirty="0"/>
+              <a:t>In the next slide, there is code for the constructor and the __add__ method. Complete out the other methods (__sub__, __</a:t>
+            </a:r>
+            <a:r>
+              <a:rPr lang="en-US" dirty="0" err="1"/>
+              <a:t>mul</a:t>
+            </a:r>
+            <a:r>
+              <a:rPr lang="en-US" dirty="0"/>
+              <a:t>__, __</a:t>
+            </a:r>
+            <a:r>
+              <a:rPr lang="en-US" dirty="0" err="1"/>
+              <a:t>truediv</a:t>
+            </a:r>
+            <a:r>
+              <a:rPr lang="en-US" dirty="0"/>
+              <a:t>__)</a:t>
+            </a:r>
+          </a:p>
+          <a:p>
+            <a:endParaRPr lang="en-US" dirty="0"/>
+          </a:p>
+          <a:p>
+            <a:r>
+              <a:rPr lang="en-US" dirty="0"/>
+              <a:t>Some other dunder methods include: __eq__ (==), __ne__(!=) and __mod__(% modulus operator)</a:t>
+            </a:r>
+          </a:p>
+        </p:txBody>
+      </p:sp>
+    </p:spTree>
+    <p:extLst>
+      <p:ext uri="{BB962C8B-B14F-4D97-AF65-F5344CB8AC3E}">
+        <p14:creationId xmlns:p14="http://schemas.microsoft.com/office/powerpoint/2010/main" val="3750115650"/>
+      </p:ext>
+    </p:extLst>
+  </p:cSld>
+  <p:clrMapOvr>
+    <a:masterClrMapping/>
+  </p:clrMapOvr>
+</p:sld>
+</file>
+
+<file path=ppt/slides/slide16.xml><?xml version="1.0" encoding="utf-8"?>
+<p:sld xmlns:a="http://schemas.openxmlformats.org/drawingml/2006/main" xmlns:r="http://schemas.openxmlformats.org/officeDocument/2006/relationships" xmlns:p="http://schemas.openxmlformats.org/presentationml/2006/main">
+  <p:cSld>
+    <p:spTree>
+      <p:nvGrpSpPr>
+        <p:cNvPr id="1" name=""/>
+        <p:cNvGrpSpPr/>
+        <p:nvPr/>
+      </p:nvGrpSpPr>
+      <p:grpSpPr>
+        <a:xfrm>
+          <a:off x="0" y="0"/>
+          <a:ext cx="0" cy="0"/>
+          <a:chOff x="0" y="0"/>
+          <a:chExt cx="0" cy="0"/>
+        </a:xfrm>
+      </p:grpSpPr>
+      <p:sp>
+        <p:nvSpPr>
+          <p:cNvPr id="4" name="Title 3">
+            <a:extLst>
+              <a:ext uri="{FF2B5EF4-FFF2-40B4-BE49-F238E27FC236}">
+                <a16:creationId xmlns:a16="http://schemas.microsoft.com/office/drawing/2014/main" id="{3E21AF7E-5C32-E9C4-29F9-E40E4FE99665}"/>
+              </a:ext>
+            </a:extLst>
+          </p:cNvPr>
+          <p:cNvSpPr>
+            <a:spLocks noGrp="1"/>
+          </p:cNvSpPr>
+          <p:nvPr>
+            <p:ph type="title"/>
+          </p:nvPr>
+        </p:nvSpPr>
+        <p:spPr/>
+        <p:txBody>
+          <a:bodyPr/>
+          <a:lstStyle/>
+          <a:p>
+            <a:r>
+              <a:rPr lang="en-US" dirty="0"/>
+              <a:t>Operator overloading – setup </a:t>
+            </a:r>
+          </a:p>
+        </p:txBody>
+      </p:sp>
+      <p:graphicFrame>
+        <p:nvGraphicFramePr>
+          <p:cNvPr id="2" name="Content Placeholder 1">
+            <a:extLst>
+              <a:ext uri="{FF2B5EF4-FFF2-40B4-BE49-F238E27FC236}">
+                <a16:creationId xmlns:a16="http://schemas.microsoft.com/office/drawing/2014/main" id="{3DBB5A26-3C5C-C0C5-71CC-B98DEBDF3143}"/>
+              </a:ext>
+            </a:extLst>
+          </p:cNvPr>
+          <p:cNvGraphicFramePr>
+            <a:graphicFrameLocks noGrp="1" noChangeAspect="1"/>
+          </p:cNvGraphicFramePr>
+          <p:nvPr>
+            <p:ph idx="1"/>
+            <p:extLst>
+              <p:ext uri="{D42A27DB-BD31-4B8C-83A1-F6EECF244321}">
+                <p14:modId xmlns:p14="http://schemas.microsoft.com/office/powerpoint/2010/main" val="3032813964"/>
+              </p:ext>
+            </p:extLst>
+          </p:nvPr>
+        </p:nvGraphicFramePr>
+        <p:xfrm>
+          <a:off x="2838450" y="1825625"/>
+          <a:ext cx="6513513" cy="4351338"/>
+        </p:xfrm>
+        <a:graphic>
+          <a:graphicData uri="http://schemas.openxmlformats.org/presentationml/2006/ole">
+            <mc:AlternateContent xmlns:mc="http://schemas.openxmlformats.org/markup-compatibility/2006">
+              <mc:Choice xmlns:v="urn:schemas-microsoft-com:vml" Requires="v">
+                <p:oleObj name="Document" r:id="rId2" imgW="8121078" imgH="5425768" progId="Word.OpenDocumentText.12">
+                  <p:embed/>
+                </p:oleObj>
+              </mc:Choice>
+              <mc:Fallback>
+                <p:oleObj name="Document" r:id="rId2" imgW="8121078" imgH="5425768" progId="Word.OpenDocumentText.12">
+                  <p:embed/>
+                  <p:pic>
+                    <p:nvPicPr>
+                      <p:cNvPr id="0" name=""/>
+                      <p:cNvPicPr/>
+                      <p:nvPr/>
+                    </p:nvPicPr>
+                    <p:blipFill>
+                      <a:blip r:embed="rId3"/>
+                      <a:stretch>
+                        <a:fillRect/>
+                      </a:stretch>
+                    </p:blipFill>
+                    <p:spPr>
+                      <a:xfrm>
+                        <a:off x="2838450" y="1825625"/>
+                        <a:ext cx="6513513" cy="4351338"/>
+                      </a:xfrm>
+                      <a:prstGeom prst="rect">
+                        <a:avLst/>
+                      </a:prstGeom>
+                    </p:spPr>
+                  </p:pic>
+                </p:oleObj>
+              </mc:Fallback>
+            </mc:AlternateContent>
+          </a:graphicData>
+        </a:graphic>
+      </p:graphicFrame>
+    </p:spTree>
+    <p:extLst>
+      <p:ext uri="{BB962C8B-B14F-4D97-AF65-F5344CB8AC3E}">
+        <p14:creationId xmlns:p14="http://schemas.microsoft.com/office/powerpoint/2010/main" val="232349902"/>
+      </p:ext>
+    </p:extLst>
+  </p:cSld>
+  <p:clrMapOvr>
+    <a:masterClrMapping/>
+  </p:clrMapOvr>
+</p:sld>
+</file>
+
 <file path=ppt/slides/slide2.xml><?xml version="1.0" encoding="utf-8"?>
 <p:sld xmlns:a="http://schemas.openxmlformats.org/drawingml/2006/main" xmlns:r="http://schemas.openxmlformats.org/officeDocument/2006/relationships" xmlns:p="http://schemas.openxmlformats.org/presentationml/2006/main">
   <p:cSld>

</xml_diff>